<commit_message>
fix: better image in presentation
</commit_message>
<xml_diff>
--- a/doc/Instrument Duel.pptx
+++ b/doc/Instrument Duel.pptx
@@ -3099,6 +3099,51 @@
           </a:prstGeom>
         </p:spPr>
       </p:pic>
+      <p:sp>
+        <p:nvSpPr>
+          <p:cNvPr id="4" name="AutoShape 2">
+            <a:extLst>
+              <a:ext uri="{FF2B5EF4-FFF2-40B4-BE49-F238E27FC236}">
+                <a16:creationId xmlns:a16="http://schemas.microsoft.com/office/drawing/2014/main" id="{FC017692-2934-48A7-8A77-7E807E1B6877}"/>
+              </a:ext>
+            </a:extLst>
+          </p:cNvPr>
+          <p:cNvSpPr>
+            <a:spLocks noChangeAspect="1" noChangeArrowheads="1"/>
+          </p:cNvSpPr>
+          <p:nvPr/>
+        </p:nvSpPr>
+        <p:spPr bwMode="auto">
+          <a:xfrm>
+            <a:off x="5943600" y="3276600"/>
+            <a:ext cx="304800" cy="304800"/>
+          </a:xfrm>
+          <a:prstGeom prst="rect">
+            <a:avLst/>
+          </a:prstGeom>
+          <a:noFill/>
+          <a:extLst>
+            <a:ext uri="{909E8E84-426E-40DD-AFC4-6F175D3DCCD1}">
+              <a14:hiddenFill xmlns:a14="http://schemas.microsoft.com/office/drawing/2010/main">
+                <a:solidFill>
+                  <a:srgbClr val="FFFFFF"/>
+                </a:solidFill>
+              </a14:hiddenFill>
+            </a:ext>
+          </a:extLst>
+        </p:spPr>
+        <p:txBody>
+          <a:bodyPr vert="horz" wrap="square" lIns="91440" tIns="45720" rIns="91440" bIns="45720" numCol="1" anchor="t" anchorCtr="0" compatLnSpc="1">
+            <a:prstTxWarp prst="textNoShape">
+              <a:avLst/>
+            </a:prstTxWarp>
+          </a:bodyPr>
+          <a:lstStyle/>
+          <a:p>
+            <a:endParaRPr lang="es-ES"/>
+          </a:p>
+        </p:txBody>
+      </p:sp>
     </p:spTree>
     <p:extLst>
       <p:ext uri="{BB962C8B-B14F-4D97-AF65-F5344CB8AC3E}">
@@ -3384,15 +3429,20 @@
           <p:nvPr/>
         </p:nvPicPr>
         <p:blipFill>
-          <a:blip r:embed="rId2"/>
-          <a:stretch>
-            <a:fillRect/>
-          </a:stretch>
+          <a:blip r:embed="rId2">
+            <a:extLst>
+              <a:ext uri="{28A0092B-C50C-407E-A947-70E740481C1C}">
+                <a14:useLocalDpi xmlns:a14="http://schemas.microsoft.com/office/drawing/2010/main" val="0"/>
+              </a:ext>
+            </a:extLst>
+          </a:blip>
+          <a:srcRect/>
+          <a:stretch/>
         </p:blipFill>
         <p:spPr>
           <a:xfrm>
-            <a:off x="3139594" y="1690688"/>
-            <a:ext cx="5912811" cy="4656667"/>
+            <a:off x="3144439" y="1690688"/>
+            <a:ext cx="5903121" cy="4656667"/>
           </a:xfrm>
           <a:prstGeom prst="rect">
             <a:avLst/>

</xml_diff>

<commit_message>
fix: embedded font in presentation
</commit_message>
<xml_diff>
--- a/doc/Instrument Duel.pptx
+++ b/doc/Instrument Duel.pptx
@@ -1,6 +1,6 @@
 
 <file path=ppt/presentation.xml><?xml version="1.0" encoding="utf-8"?>
-<p:presentation xmlns:a="http://schemas.openxmlformats.org/drawingml/2006/main" xmlns:r="http://schemas.openxmlformats.org/officeDocument/2006/relationships" xmlns:p="http://schemas.openxmlformats.org/presentationml/2006/main" saveSubsetFonts="1">
+<p:presentation xmlns:a="http://schemas.openxmlformats.org/drawingml/2006/main" xmlns:r="http://schemas.openxmlformats.org/officeDocument/2006/relationships" xmlns:p="http://schemas.openxmlformats.org/presentationml/2006/main" embedTrueTypeFonts="1" saveSubsetFonts="1">
   <p:sldMasterIdLst>
     <p:sldMasterId id="2147483660" r:id="rId1"/>
   </p:sldMasterIdLst>
@@ -16,6 +16,28 @@
   </p:sldIdLst>
   <p:sldSz cx="12192000" cy="6858000"/>
   <p:notesSz cx="6858000" cy="9144000"/>
+  <p:embeddedFontLst>
+    <p:embeddedFont>
+      <p:font typeface="Calibri" panose="020F0502020204030204" pitchFamily="34" charset="0"/>
+      <p:regular r:id="rId10"/>
+      <p:bold r:id="rId11"/>
+      <p:italic r:id="rId12"/>
+      <p:boldItalic r:id="rId13"/>
+    </p:embeddedFont>
+    <p:embeddedFont>
+      <p:font typeface="Calibri Light" panose="020F0302020204030204" pitchFamily="34" charset="0"/>
+      <p:regular r:id="rId14"/>
+      <p:italic r:id="rId15"/>
+    </p:embeddedFont>
+    <p:embeddedFont>
+      <p:font typeface="Friday Night Funkin" panose="02000503000000000000" pitchFamily="2" charset="0"/>
+      <p:regular r:id="rId16"/>
+    </p:embeddedFont>
+    <p:embeddedFont>
+      <p:font typeface="Next Ups" panose="03000600000000000000" pitchFamily="66" charset="0"/>
+      <p:regular r:id="rId17"/>
+    </p:embeddedFont>
+  </p:embeddedFontLst>
   <p:defaultTextStyle>
     <a:defPPr>
       <a:defRPr lang="en-US"/>

</xml_diff>

<commit_message>
fix: fixed the presentation
</commit_message>
<xml_diff>
--- a/doc/Instrument Duel.pptx
+++ b/doc/Instrument Duel.pptx
@@ -3042,7 +3042,7 @@
                 </a:solidFill>
                 <a:latin typeface="Next Ups" panose="03000600000000000000" pitchFamily="66" charset="0"/>
               </a:rPr>
-              <a:t>INSTTRUMENT DUEL</a:t>
+              <a:t>INSTRUMENT DUEL</a:t>
             </a:r>
           </a:p>
         </p:txBody>
@@ -3163,6 +3163,73 @@
           <a:lstStyle/>
           <a:p>
             <a:endParaRPr lang="es-ES"/>
+          </a:p>
+        </p:txBody>
+      </p:sp>
+      <p:sp>
+        <p:nvSpPr>
+          <p:cNvPr id="6" name="CuadroTexto 5">
+            <a:extLst>
+              <a:ext uri="{FF2B5EF4-FFF2-40B4-BE49-F238E27FC236}">
+                <a16:creationId xmlns:a16="http://schemas.microsoft.com/office/drawing/2014/main" id="{2B7249C8-61EC-4FF4-A434-402B2B91513A}"/>
+              </a:ext>
+            </a:extLst>
+          </p:cNvPr>
+          <p:cNvSpPr txBox="1"/>
+          <p:nvPr/>
+        </p:nvSpPr>
+        <p:spPr>
+          <a:xfrm>
+            <a:off x="160867" y="6358467"/>
+            <a:ext cx="4089400" cy="369332"/>
+          </a:xfrm>
+          <a:prstGeom prst="rect">
+            <a:avLst/>
+          </a:prstGeom>
+          <a:noFill/>
+        </p:spPr>
+        <p:txBody>
+          <a:bodyPr wrap="square" rtlCol="0">
+            <a:spAutoFit/>
+          </a:bodyPr>
+          <a:lstStyle/>
+          <a:p>
+            <a:r>
+              <a:rPr lang="es-ES" dirty="0" err="1">
+                <a:latin typeface="Friday Night Funkin" panose="02000503000000000000" pitchFamily="2" charset="0"/>
+              </a:rPr>
+              <a:t>By</a:t>
+            </a:r>
+            <a:r>
+              <a:rPr lang="es-ES" dirty="0">
+                <a:latin typeface="Friday Night Funkin" panose="02000503000000000000" pitchFamily="2" charset="0"/>
+              </a:rPr>
+              <a:t> </a:t>
+            </a:r>
+            <a:r>
+              <a:rPr lang="es-ES" dirty="0" err="1">
+                <a:latin typeface="Friday Night Funkin" panose="02000503000000000000" pitchFamily="2" charset="0"/>
+              </a:rPr>
+              <a:t>Bugra</a:t>
+            </a:r>
+            <a:r>
+              <a:rPr lang="es-ES" dirty="0">
+                <a:latin typeface="Friday Night Funkin" panose="02000503000000000000" pitchFamily="2" charset="0"/>
+              </a:rPr>
+              <a:t> </a:t>
+            </a:r>
+            <a:r>
+              <a:rPr lang="es-ES" dirty="0" err="1">
+                <a:latin typeface="Friday Night Funkin" panose="02000503000000000000" pitchFamily="2" charset="0"/>
+              </a:rPr>
+              <a:t>Kok</a:t>
+            </a:r>
+            <a:r>
+              <a:rPr lang="es-ES" dirty="0">
+                <a:latin typeface="Friday Night Funkin" panose="02000503000000000000" pitchFamily="2" charset="0"/>
+              </a:rPr>
+              <a:t> and Sergio Benito</a:t>
+            </a:r>
           </a:p>
         </p:txBody>
       </p:sp>

</xml_diff>